<commit_message>
change report and slide
</commit_message>
<xml_diff>
--- a/Slide.pptx
+++ b/Slide.pptx
@@ -13347,7 +13347,7 @@
           <a:p>
             <a:fld id="{1160EA64-D806-43AC-9DF2-F8C432F32B4C}" type="datetimeFigureOut">
               <a:rPr lang="en-US" dirty="0"/>
-              <a:t>7/7/2021</a:t>
+              <a:t>1/6/2022</a:t>
             </a:fld>
             <a:endParaRPr lang="en-US" dirty="0"/>
           </a:p>
@@ -14890,7 +14890,7 @@
             </a:pPr>
             <a:r>
               <a:rPr lang="en" sz="1800" dirty="0" smtClean="0"/>
-              <a:t>NHẬP MÔN THỊ GIÁC MÁY TÍNH VÀ NÂNG CAO</a:t>
+              <a:t>XỬ LÝ ẢNH VÀ ỨNG DỤNG</a:t>
             </a:r>
             <a:r>
               <a:rPr lang="en" sz="2000" dirty="0" smtClean="0"/>
@@ -14900,12 +14900,12 @@
               <a:rPr lang="en" sz="2000" dirty="0" smtClean="0"/>
             </a:br>
             <a:r>
-              <a:rPr lang="en" sz="3200" b="1" dirty="0" smtClean="0"/>
-              <a:t>HÀM </a:t>
-            </a:r>
-            <a:r>
-              <a:rPr lang="en" sz="3200" b="1" dirty="0" smtClean="0"/>
-              <a:t>VÀ CHƯƠNG TRÌNH CON</a:t>
+              <a:rPr lang="en" sz="2800" b="1" dirty="0" smtClean="0"/>
+              <a:t>NHẬN D</a:t>
+            </a:r>
+            <a:r>
+              <a:rPr lang="en-US" sz="2800" b="1" dirty="0" smtClean="0"/>
+              <a:t>IỆN BIỂN BÁO GIAO THÔNG</a:t>
             </a:r>
             <a:r>
               <a:rPr lang="en" sz="3600" b="1" dirty="0" smtClean="0"/>
@@ -14920,11 +14920,7 @@
             </a:r>
             <a:r>
               <a:rPr lang="en" sz="1400" dirty="0" smtClean="0"/>
-              <a:t>TS Lê Minh Hưng</a:t>
-            </a:r>
-            <a:r>
-              <a:rPr lang="en" sz="1400" dirty="0" smtClean="0"/>
-              <a:t/>
+              <a:t>TS Mai Tiến Dũng</a:t>
             </a:r>
             <a:br>
               <a:rPr lang="en" sz="1400" dirty="0" smtClean="0"/>
@@ -14944,21 +14940,6 @@
             <a:r>
               <a:rPr lang="en" sz="1400" dirty="0" smtClean="0"/>
               <a:t>16521759</a:t>
-            </a:r>
-            <a:r>
-              <a:rPr lang="en" sz="1400" dirty="0"/>
-              <a:t/>
-            </a:r>
-            <a:br>
-              <a:rPr lang="en" sz="1400" dirty="0"/>
-            </a:br>
-            <a:r>
-              <a:rPr lang="en" sz="1400" dirty="0"/>
-              <a:t>SVTH: </a:t>
-            </a:r>
-            <a:r>
-              <a:rPr lang="en" sz="1400" dirty="0" smtClean="0"/>
-              <a:t>Lê Công Nghị - 16521745</a:t>
             </a:r>
             <a:endParaRPr sz="1400" dirty="0"/>
           </a:p>
@@ -20599,9 +20580,6 @@
               </a:rPr>
               <a:t>.</a:t>
             </a:r>
-            <a:endParaRPr lang="en-US" sz="2000" dirty="0">
-              <a:latin typeface="Barlow Light" panose="020B0604020202020204" charset="0"/>
-            </a:endParaRPr>
           </a:p>
         </p:txBody>
       </p:sp>

</xml_diff>